<commit_message>
Update lectures with correct titles. Add outline of latency discussion to communication lecture
</commit_message>
<xml_diff>
--- a/undergraduate/lectures/lecture1-intro.pptx
+++ b/undergraduate/lectures/lecture1-intro.pptx
@@ -358,7 +358,7 @@
           <a:p>
             <a:fld id="{EC53E720-1243-6043-B4C4-6E31C619CC0A}" type="datetimeFigureOut">
               <a:rPr lang="en-US" smtClean="0"/>
-              <a:t>12/4/16</a:t>
+              <a:t>2/1/17</a:t>
             </a:fld>
             <a:endParaRPr lang="en-US"/>
           </a:p>
@@ -1025,7 +1025,7 @@
           <a:p>
             <a:fld id="{95DA03C6-6B2A-3D4E-ACBF-63391107FCA5}" type="datetime1">
               <a:rPr lang="en-US" smtClean="0"/>
-              <a:t>12/4/16</a:t>
+              <a:t>2/1/17</a:t>
             </a:fld>
             <a:endParaRPr lang="en-US"/>
           </a:p>
@@ -1304,7 +1304,7 @@
           <a:p>
             <a:fld id="{652B615D-AC37-794B-9CD1-917BECA41F70}" type="datetime1">
               <a:rPr lang="en-US" smtClean="0"/>
-              <a:t>12/4/16</a:t>
+              <a:t>2/1/17</a:t>
             </a:fld>
             <a:endParaRPr lang="en-US"/>
           </a:p>
@@ -1559,7 +1559,7 @@
           <a:p>
             <a:fld id="{5DC51015-F320-0A4F-959E-3D859876C438}" type="datetime1">
               <a:rPr lang="en-US" smtClean="0"/>
-              <a:t>12/4/16</a:t>
+              <a:t>2/1/17</a:t>
             </a:fld>
             <a:endParaRPr lang="en-US"/>
           </a:p>
@@ -1737,7 +1737,7 @@
           <a:p>
             <a:fld id="{4B1B9092-98F8-3943-8253-FED67AD371E9}" type="datetime1">
               <a:rPr lang="en-US" smtClean="0"/>
-              <a:t>12/4/16</a:t>
+              <a:t>2/1/17</a:t>
             </a:fld>
             <a:endParaRPr lang="en-US"/>
           </a:p>
@@ -2086,7 +2086,7 @@
           <a:p>
             <a:fld id="{28960D5E-7767-5B4E-BF7E-AE3C5D61F3FF}" type="datetime1">
               <a:rPr lang="en-US" smtClean="0"/>
-              <a:t>12/4/16</a:t>
+              <a:t>2/1/17</a:t>
             </a:fld>
             <a:endParaRPr lang="en-US"/>
           </a:p>
@@ -2380,7 +2380,7 @@
           <a:p>
             <a:fld id="{416A0E0A-1609-FB44-8228-EEF5C54B5A55}" type="datetime1">
               <a:rPr lang="en-US" smtClean="0"/>
-              <a:t>12/4/16</a:t>
+              <a:t>2/1/17</a:t>
             </a:fld>
             <a:endParaRPr lang="en-US" dirty="0"/>
           </a:p>
@@ -2767,7 +2767,7 @@
           <a:p>
             <a:fld id="{8D566A62-F6F0-FB4F-9669-760CD9DCEC73}" type="datetime1">
               <a:rPr lang="en-US" smtClean="0"/>
-              <a:t>12/4/16</a:t>
+              <a:t>2/1/17</a:t>
             </a:fld>
             <a:endParaRPr lang="en-US"/>
           </a:p>
@@ -2891,7 +2891,7 @@
           <a:p>
             <a:fld id="{6B34C88A-1865-1F43-A0DB-344805F7492E}" type="datetime1">
               <a:rPr lang="en-US" smtClean="0"/>
-              <a:t>12/4/16</a:t>
+              <a:t>2/1/17</a:t>
             </a:fld>
             <a:endParaRPr lang="en-US"/>
           </a:p>
@@ -3068,7 +3068,7 @@
           <a:p>
             <a:fld id="{8B4004B4-FF14-FF4D-B044-59094E9AC0F1}" type="datetime1">
               <a:rPr lang="en-US" smtClean="0"/>
-              <a:t>12/4/16</a:t>
+              <a:t>2/1/17</a:t>
             </a:fld>
             <a:endParaRPr lang="en-US"/>
           </a:p>
@@ -3428,7 +3428,7 @@
           <a:p>
             <a:fld id="{862984A0-B2F5-2549-A24F-764B1F76A93B}" type="datetime1">
               <a:rPr lang="en-US" smtClean="0"/>
-              <a:t>12/4/16</a:t>
+              <a:t>2/1/17</a:t>
             </a:fld>
             <a:endParaRPr lang="en-US"/>
           </a:p>
@@ -3813,7 +3813,7 @@
           <a:p>
             <a:fld id="{6F310967-D635-1C4B-8010-EE130F91BB63}" type="datetime1">
               <a:rPr lang="en-US" smtClean="0"/>
-              <a:t>12/4/16</a:t>
+              <a:t>2/1/17</a:t>
             </a:fld>
             <a:endParaRPr lang="en-US"/>
           </a:p>
@@ -4099,7 +4099,7 @@
           <a:p>
             <a:fld id="{B27188E3-ED48-3E43-BB72-DB8091BEB4A5}" type="datetime1">
               <a:rPr lang="en-US" smtClean="0"/>
-              <a:t>12/4/16</a:t>
+              <a:t>2/1/17</a:t>
             </a:fld>
             <a:endParaRPr lang="en-US" dirty="0"/>
           </a:p>
@@ -4753,8 +4753,12 @@
           </a:p>
           <a:p>
             <a:r>
+              <a:rPr lang="en-US" smtClean="0"/>
+              <a:t>george </a:t>
+            </a:r>
+            <a:r>
               <a:rPr lang="en-US" dirty="0" err="1" smtClean="0"/>
-              <a:t>gnn@freebsd.org</a:t>
+              <a:t>neville-neil</a:t>
             </a:r>
             <a:endParaRPr lang="en-US" dirty="0"/>
           </a:p>

</xml_diff>